<commit_message>
Scaled map to A4
</commit_message>
<xml_diff>
--- a/prototype/prototype v2.pptx
+++ b/prototype/prototype v2.pptx
@@ -12,6 +12,7 @@
     <p:sldId id="262" r:id="rId6"/>
     <p:sldId id="263" r:id="rId7"/>
     <p:sldId id="264" r:id="rId8"/>
+    <p:sldId id="265" r:id="rId9"/>
   </p:sldIdLst>
   <p:sldSz cx="13860463" cy="7019925"/>
   <p:notesSz cx="6858000" cy="9144000"/>
@@ -249,7 +250,7 @@
           <a:p>
             <a:fld id="{335A01E9-5263-49B0-BF31-C9D0821B9F5E}" type="datetimeFigureOut">
               <a:rPr lang="en-NL" smtClean="0"/>
-              <a:t>02/01/2025</a:t>
+              <a:t>03/01/2025</a:t>
             </a:fld>
             <a:endParaRPr lang="en-NL"/>
           </a:p>
@@ -419,7 +420,7 @@
           <a:p>
             <a:fld id="{335A01E9-5263-49B0-BF31-C9D0821B9F5E}" type="datetimeFigureOut">
               <a:rPr lang="en-NL" smtClean="0"/>
-              <a:t>02/01/2025</a:t>
+              <a:t>03/01/2025</a:t>
             </a:fld>
             <a:endParaRPr lang="en-NL"/>
           </a:p>
@@ -599,7 +600,7 @@
           <a:p>
             <a:fld id="{335A01E9-5263-49B0-BF31-C9D0821B9F5E}" type="datetimeFigureOut">
               <a:rPr lang="en-NL" smtClean="0"/>
-              <a:t>02/01/2025</a:t>
+              <a:t>03/01/2025</a:t>
             </a:fld>
             <a:endParaRPr lang="en-NL"/>
           </a:p>
@@ -769,7 +770,7 @@
           <a:p>
             <a:fld id="{335A01E9-5263-49B0-BF31-C9D0821B9F5E}" type="datetimeFigureOut">
               <a:rPr lang="en-NL" smtClean="0"/>
-              <a:t>02/01/2025</a:t>
+              <a:t>03/01/2025</a:t>
             </a:fld>
             <a:endParaRPr lang="en-NL"/>
           </a:p>
@@ -1015,7 +1016,7 @@
           <a:p>
             <a:fld id="{335A01E9-5263-49B0-BF31-C9D0821B9F5E}" type="datetimeFigureOut">
               <a:rPr lang="en-NL" smtClean="0"/>
-              <a:t>02/01/2025</a:t>
+              <a:t>03/01/2025</a:t>
             </a:fld>
             <a:endParaRPr lang="en-NL"/>
           </a:p>
@@ -1247,7 +1248,7 @@
           <a:p>
             <a:fld id="{335A01E9-5263-49B0-BF31-C9D0821B9F5E}" type="datetimeFigureOut">
               <a:rPr lang="en-NL" smtClean="0"/>
-              <a:t>02/01/2025</a:t>
+              <a:t>03/01/2025</a:t>
             </a:fld>
             <a:endParaRPr lang="en-NL"/>
           </a:p>
@@ -1614,7 +1615,7 @@
           <a:p>
             <a:fld id="{335A01E9-5263-49B0-BF31-C9D0821B9F5E}" type="datetimeFigureOut">
               <a:rPr lang="en-NL" smtClean="0"/>
-              <a:t>02/01/2025</a:t>
+              <a:t>03/01/2025</a:t>
             </a:fld>
             <a:endParaRPr lang="en-NL"/>
           </a:p>
@@ -1732,7 +1733,7 @@
           <a:p>
             <a:fld id="{335A01E9-5263-49B0-BF31-C9D0821B9F5E}" type="datetimeFigureOut">
               <a:rPr lang="en-NL" smtClean="0"/>
-              <a:t>02/01/2025</a:t>
+              <a:t>03/01/2025</a:t>
             </a:fld>
             <a:endParaRPr lang="en-NL"/>
           </a:p>
@@ -1827,7 +1828,7 @@
           <a:p>
             <a:fld id="{335A01E9-5263-49B0-BF31-C9D0821B9F5E}" type="datetimeFigureOut">
               <a:rPr lang="en-NL" smtClean="0"/>
-              <a:t>02/01/2025</a:t>
+              <a:t>03/01/2025</a:t>
             </a:fld>
             <a:endParaRPr lang="en-NL"/>
           </a:p>
@@ -2104,7 +2105,7 @@
           <a:p>
             <a:fld id="{335A01E9-5263-49B0-BF31-C9D0821B9F5E}" type="datetimeFigureOut">
               <a:rPr lang="en-NL" smtClean="0"/>
-              <a:t>02/01/2025</a:t>
+              <a:t>03/01/2025</a:t>
             </a:fld>
             <a:endParaRPr lang="en-NL"/>
           </a:p>
@@ -2361,7 +2362,7 @@
           <a:p>
             <a:fld id="{335A01E9-5263-49B0-BF31-C9D0821B9F5E}" type="datetimeFigureOut">
               <a:rPr lang="en-NL" smtClean="0"/>
-              <a:t>02/01/2025</a:t>
+              <a:t>03/01/2025</a:t>
             </a:fld>
             <a:endParaRPr lang="en-NL"/>
           </a:p>
@@ -2574,7 +2575,7 @@
           <a:p>
             <a:fld id="{335A01E9-5263-49B0-BF31-C9D0821B9F5E}" type="datetimeFigureOut">
               <a:rPr lang="en-NL" smtClean="0"/>
-              <a:t>02/01/2025</a:t>
+              <a:t>03/01/2025</a:t>
             </a:fld>
             <a:endParaRPr lang="en-NL"/>
           </a:p>
@@ -20624,7 +20625,10 @@
     <p:bg>
       <p:bgPr>
         <a:solidFill>
-          <a:srgbClr val="1A2230"/>
+          <a:schemeClr val="tx1">
+            <a:lumMod val="75000"/>
+            <a:lumOff val="25000"/>
+          </a:schemeClr>
         </a:solidFill>
         <a:effectLst/>
       </p:bgPr>
@@ -20743,7 +20747,7 @@
         </p:blipFill>
         <p:spPr>
           <a:xfrm>
-            <a:off x="630231" y="-3086531"/>
+            <a:off x="804801" y="-5798915"/>
             <a:ext cx="12250860" cy="3086531"/>
           </a:xfrm>
           <a:prstGeom prst="rect">
@@ -20773,7 +20777,7 @@
         </p:blipFill>
         <p:spPr>
           <a:xfrm>
-            <a:off x="258090" y="7289962"/>
+            <a:off x="630231" y="-2612634"/>
             <a:ext cx="12403281" cy="2476846"/>
           </a:xfrm>
           <a:prstGeom prst="rect">
@@ -22134,10 +22138,10 @@
       </p:grpSp>
       <p:pic>
         <p:nvPicPr>
-          <p:cNvPr id="87" name="Picture 86">
-            <a:extLst>
-              <a:ext uri="{FF2B5EF4-FFF2-40B4-BE49-F238E27FC236}">
-                <a16:creationId xmlns:a16="http://schemas.microsoft.com/office/drawing/2014/main" id="{58A7338A-84E3-728F-9612-648DEAD652B8}"/>
+          <p:cNvPr id="88" name="Graphic 87" descr="User with solid fill">
+            <a:extLst>
+              <a:ext uri="{FF2B5EF4-FFF2-40B4-BE49-F238E27FC236}">
+                <a16:creationId xmlns:a16="http://schemas.microsoft.com/office/drawing/2014/main" id="{A1E8E3B4-EF26-D7AD-7B02-8362E12DCCBD}"/>
               </a:ext>
             </a:extLst>
           </p:cNvPr>
@@ -22147,40 +22151,10 @@
           <p:nvPr/>
         </p:nvPicPr>
         <p:blipFill>
-          <a:blip r:embed="rId14"/>
-          <a:stretch>
-            <a:fillRect/>
-          </a:stretch>
-        </p:blipFill>
-        <p:spPr>
-          <a:xfrm>
-            <a:off x="-1457684" y="-1779538"/>
-            <a:ext cx="1295829" cy="4569500"/>
-          </a:xfrm>
-          <a:prstGeom prst="rect">
-            <a:avLst/>
-          </a:prstGeom>
-        </p:spPr>
-      </p:pic>
-      <p:pic>
-        <p:nvPicPr>
-          <p:cNvPr id="88" name="Graphic 87" descr="User with solid fill">
-            <a:extLst>
-              <a:ext uri="{FF2B5EF4-FFF2-40B4-BE49-F238E27FC236}">
-                <a16:creationId xmlns:a16="http://schemas.microsoft.com/office/drawing/2014/main" id="{A1E8E3B4-EF26-D7AD-7B02-8362E12DCCBD}"/>
-              </a:ext>
-            </a:extLst>
-          </p:cNvPr>
-          <p:cNvPicPr>
-            <a:picLocks noChangeAspect="1"/>
-          </p:cNvPicPr>
-          <p:nvPr/>
-        </p:nvPicPr>
-        <p:blipFill>
-          <a:blip r:embed="rId15">
+          <a:blip r:embed="rId14">
             <a:extLst>
               <a:ext uri="{96DAC541-7B7A-43D3-8B79-37D633B846F1}">
-                <asvg:svgBlip xmlns:asvg="http://schemas.microsoft.com/office/drawing/2016/SVG/main" r:embed="rId16"/>
+                <asvg:svgBlip xmlns:asvg="http://schemas.microsoft.com/office/drawing/2016/SVG/main" r:embed="rId15"/>
               </a:ext>
             </a:extLst>
           </a:blip>
@@ -22213,10 +22187,10 @@
           <p:nvPr/>
         </p:nvPicPr>
         <p:blipFill>
-          <a:blip r:embed="rId17">
+          <a:blip r:embed="rId16">
             <a:extLst>
               <a:ext uri="{96DAC541-7B7A-43D3-8B79-37D633B846F1}">
-                <asvg:svgBlip xmlns:asvg="http://schemas.microsoft.com/office/drawing/2016/SVG/main" r:embed="rId18"/>
+                <asvg:svgBlip xmlns:asvg="http://schemas.microsoft.com/office/drawing/2016/SVG/main" r:embed="rId17"/>
               </a:ext>
             </a:extLst>
           </a:blip>
@@ -22515,10 +22489,10 @@
           <p:nvPr/>
         </p:nvPicPr>
         <p:blipFill>
-          <a:blip r:embed="rId19">
+          <a:blip r:embed="rId18">
             <a:extLst>
               <a:ext uri="{96DAC541-7B7A-43D3-8B79-37D633B846F1}">
-                <asvg:svgBlip xmlns:asvg="http://schemas.microsoft.com/office/drawing/2016/SVG/main" r:embed="rId20"/>
+                <asvg:svgBlip xmlns:asvg="http://schemas.microsoft.com/office/drawing/2016/SVG/main" r:embed="rId19"/>
               </a:ext>
             </a:extLst>
           </a:blip>
@@ -22551,10 +22525,10 @@
           <p:nvPr/>
         </p:nvPicPr>
         <p:blipFill>
-          <a:blip r:embed="rId21">
+          <a:blip r:embed="rId20">
             <a:extLst>
               <a:ext uri="{96DAC541-7B7A-43D3-8B79-37D633B846F1}">
-                <asvg:svgBlip xmlns:asvg="http://schemas.microsoft.com/office/drawing/2016/SVG/main" r:embed="rId22"/>
+                <asvg:svgBlip xmlns:asvg="http://schemas.microsoft.com/office/drawing/2016/SVG/main" r:embed="rId21"/>
               </a:ext>
             </a:extLst>
           </a:blip>
@@ -22711,10 +22685,10 @@
             <p:nvPr/>
           </p:nvPicPr>
           <p:blipFill>
-            <a:blip r:embed="rId23">
+            <a:blip r:embed="rId22">
               <a:extLst>
                 <a:ext uri="{96DAC541-7B7A-43D3-8B79-37D633B846F1}">
-                  <asvg:svgBlip xmlns:asvg="http://schemas.microsoft.com/office/drawing/2016/SVG/main" r:embed="rId24"/>
+                  <asvg:svgBlip xmlns:asvg="http://schemas.microsoft.com/office/drawing/2016/SVG/main" r:embed="rId23"/>
                 </a:ext>
               </a:extLst>
             </a:blip>
@@ -23260,10 +23234,10 @@
             <p:nvPr/>
           </p:nvPicPr>
           <p:blipFill>
-            <a:blip r:embed="rId25">
+            <a:blip r:embed="rId24">
               <a:extLst>
                 <a:ext uri="{96DAC541-7B7A-43D3-8B79-37D633B846F1}">
-                  <asvg:svgBlip xmlns:asvg="http://schemas.microsoft.com/office/drawing/2016/SVG/main" r:embed="rId26"/>
+                  <asvg:svgBlip xmlns:asvg="http://schemas.microsoft.com/office/drawing/2016/SVG/main" r:embed="rId25"/>
                 </a:ext>
               </a:extLst>
             </a:blip>
@@ -24044,6 +24018,98 @@
     <p:extLst>
       <p:ext uri="{BB962C8B-B14F-4D97-AF65-F5344CB8AC3E}">
         <p14:creationId xmlns:p14="http://schemas.microsoft.com/office/powerpoint/2010/main" val="3528684350"/>
+      </p:ext>
+    </p:extLst>
+  </p:cSld>
+  <p:clrMapOvr>
+    <a:masterClrMapping/>
+  </p:clrMapOvr>
+</p:sld>
+</file>
+
+<file path=ppt/slides/slide8.xml><?xml version="1.0" encoding="utf-8"?>
+<p:sld xmlns:a="http://schemas.openxmlformats.org/drawingml/2006/main" xmlns:r="http://schemas.openxmlformats.org/officeDocument/2006/relationships" xmlns:p="http://schemas.openxmlformats.org/presentationml/2006/main">
+  <p:cSld>
+    <p:spTree>
+      <p:nvGrpSpPr>
+        <p:cNvPr id="1" name="">
+          <a:extLst>
+            <a:ext uri="{FF2B5EF4-FFF2-40B4-BE49-F238E27FC236}">
+              <a16:creationId xmlns:a16="http://schemas.microsoft.com/office/drawing/2014/main" id="{27B067A6-BBC8-72FA-E25B-6BBF488304A6}"/>
+            </a:ext>
+          </a:extLst>
+        </p:cNvPr>
+        <p:cNvGrpSpPr/>
+        <p:nvPr/>
+      </p:nvGrpSpPr>
+      <p:grpSpPr>
+        <a:xfrm>
+          <a:off x="0" y="0"/>
+          <a:ext cx="0" cy="0"/>
+          <a:chOff x="0" y="0"/>
+          <a:chExt cx="0" cy="0"/>
+        </a:xfrm>
+      </p:grpSpPr>
+      <p:sp>
+        <p:nvSpPr>
+          <p:cNvPr id="9" name="TextBox 8">
+            <a:extLst>
+              <a:ext uri="{FF2B5EF4-FFF2-40B4-BE49-F238E27FC236}">
+                <a16:creationId xmlns:a16="http://schemas.microsoft.com/office/drawing/2014/main" id="{2B784415-A40C-6C44-B9B0-B56AF50F3196}"/>
+              </a:ext>
+            </a:extLst>
+          </p:cNvPr>
+          <p:cNvSpPr txBox="1"/>
+          <p:nvPr/>
+        </p:nvSpPr>
+        <p:spPr>
+          <a:xfrm>
+            <a:off x="450231" y="629962"/>
+            <a:ext cx="7562383" cy="1569660"/>
+          </a:xfrm>
+          <a:prstGeom prst="rect">
+            <a:avLst/>
+          </a:prstGeom>
+          <a:noFill/>
+        </p:spPr>
+        <p:txBody>
+          <a:bodyPr wrap="square">
+            <a:spAutoFit/>
+          </a:bodyPr>
+          <a:lstStyle/>
+          <a:p>
+            <a:r>
+              <a:rPr lang="en-GB" sz="9600" b="1" dirty="0">
+                <a:latin typeface="Rubik" pitchFamily="2" charset="-79"/>
+                <a:cs typeface="Rubik" pitchFamily="2" charset="-79"/>
+              </a:rPr>
+              <a:t>HIDE</a:t>
+            </a:r>
+            <a:r>
+              <a:rPr lang="en-GB" sz="9600" b="1" dirty="0">
+                <a:solidFill>
+                  <a:srgbClr val="FF0000"/>
+                </a:solidFill>
+                <a:latin typeface="Rubik" pitchFamily="2" charset="-79"/>
+                <a:cs typeface="Rubik" pitchFamily="2" charset="-79"/>
+              </a:rPr>
+              <a:t>+</a:t>
+            </a:r>
+            <a:r>
+              <a:rPr lang="en-GB" sz="9600" b="1" dirty="0">
+                <a:latin typeface="Rubik" pitchFamily="2" charset="-79"/>
+                <a:cs typeface="Rubik" pitchFamily="2" charset="-79"/>
+              </a:rPr>
+              <a:t>SEEK</a:t>
+            </a:r>
+            <a:endParaRPr lang="en-NL" dirty="0"/>
+          </a:p>
+        </p:txBody>
+      </p:sp>
+    </p:spTree>
+    <p:extLst>
+      <p:ext uri="{BB962C8B-B14F-4D97-AF65-F5344CB8AC3E}">
+        <p14:creationId xmlns:p14="http://schemas.microsoft.com/office/powerpoint/2010/main" val="1229900368"/>
       </p:ext>
     </p:extLst>
   </p:cSld>

</xml_diff>